<commit_message>
Double-checked spelling errors & updated graphs in powerpoint
</commit_message>
<xml_diff>
--- a/Project.pptx
+++ b/Project.pptx
@@ -15062,37 +15062,32 @@
       </p:sp>
       <p:pic>
         <p:nvPicPr>
-          <p:cNvPr id="7" name="Content Placeholder 6" descr="A graph of different numbers and colors&#10;&#10;Description automatically generated with medium confidence">
+          <p:cNvPr id="4" name="Picture 3">
             <a:extLst>
               <a:ext uri="{FF2B5EF4-FFF2-40B4-BE49-F238E27FC236}">
-                <a16:creationId xmlns:a16="http://schemas.microsoft.com/office/drawing/2014/main" id="{297D8E44-34C0-609F-4F2C-9C68FA3A566D}"/>
+                <a16:creationId xmlns:a16="http://schemas.microsoft.com/office/drawing/2014/main" id="{22D7473F-FCBA-19A0-E95E-CE44820F544B}"/>
               </a:ext>
             </a:extLst>
           </p:cNvPr>
           <p:cNvPicPr>
-            <a:picLocks noGrp="1" noChangeAspect="1"/>
+            <a:picLocks noChangeAspect="1"/>
           </p:cNvPicPr>
-          <p:nvPr>
-            <p:ph sz="half" idx="1"/>
-          </p:nvPr>
+          <p:nvPr/>
         </p:nvPicPr>
         <p:blipFill>
-          <a:blip r:embed="rId2">
-            <a:extLst>
-              <a:ext uri="{28A0092B-C50C-407E-A947-70E740481C1C}">
-                <a14:useLocalDpi xmlns:a14="http://schemas.microsoft.com/office/drawing/2010/main" val="0"/>
-              </a:ext>
-            </a:extLst>
-          </a:blip>
+          <a:blip r:embed="rId2"/>
           <a:stretch>
             <a:fillRect/>
           </a:stretch>
         </p:blipFill>
         <p:spPr>
           <a:xfrm>
-            <a:off x="6089517" y="967184"/>
-            <a:ext cx="5725796" cy="4923632"/>
+            <a:off x="5965886" y="885825"/>
+            <a:ext cx="5715000" cy="5086350"/>
           </a:xfrm>
+          <a:prstGeom prst="rect">
+            <a:avLst/>
+          </a:prstGeom>
         </p:spPr>
       </p:pic>
     </p:spTree>
@@ -15135,7 +15130,7 @@
       </p:grpSpPr>
       <p:sp useBgFill="1">
         <p:nvSpPr>
-          <p:cNvPr id="29" name="Rectangle 28">
+          <p:cNvPr id="40" name="Rectangle 39">
             <a:extLst>
               <a:ext uri="{FF2B5EF4-FFF2-40B4-BE49-F238E27FC236}">
                 <a16:creationId xmlns:a16="http://schemas.microsoft.com/office/drawing/2014/main" id="{04812C46-200A-4DEB-A05E-3ED6C68C2387}"/>
@@ -15195,28 +15190,20 @@
       </p:sp>
       <p:pic>
         <p:nvPicPr>
-          <p:cNvPr id="7" name="Content Placeholder 6" descr="A graph of a graph showing a number of different colored bars&#10;&#10;Description automatically generated with medium confidence">
+          <p:cNvPr id="4" name="Picture 3">
             <a:extLst>
               <a:ext uri="{FF2B5EF4-FFF2-40B4-BE49-F238E27FC236}">
-                <a16:creationId xmlns:a16="http://schemas.microsoft.com/office/drawing/2014/main" id="{7EFE8EC4-6D1B-2D98-1CB1-8856194010D8}"/>
+                <a16:creationId xmlns:a16="http://schemas.microsoft.com/office/drawing/2014/main" id="{E5A755E1-6D1E-51AC-03E4-E7FD9D0A14CF}"/>
               </a:ext>
             </a:extLst>
           </p:cNvPr>
           <p:cNvPicPr>
-            <a:picLocks noGrp="1" noChangeAspect="1"/>
+            <a:picLocks noChangeAspect="1"/>
           </p:cNvPicPr>
-          <p:nvPr>
-            <p:ph sz="half" idx="1"/>
-          </p:nvPr>
+          <p:nvPr/>
         </p:nvPicPr>
         <p:blipFill>
-          <a:blip r:embed="rId2">
-            <a:extLst>
-              <a:ext uri="{28A0092B-C50C-407E-A947-70E740481C1C}">
-                <a14:useLocalDpi xmlns:a14="http://schemas.microsoft.com/office/drawing/2010/main" val="0"/>
-              </a:ext>
-            </a:extLst>
-          </a:blip>
+          <a:blip r:embed="rId2"/>
           <a:srcRect r="596"/>
           <a:stretch/>
         </p:blipFill>
@@ -15232,7 +15219,7 @@
       </p:pic>
       <p:sp>
         <p:nvSpPr>
-          <p:cNvPr id="31" name="Rectangle 30">
+          <p:cNvPr id="41" name="Rectangle 40">
             <a:extLst>
               <a:ext uri="{FF2B5EF4-FFF2-40B4-BE49-F238E27FC236}">
                 <a16:creationId xmlns:a16="http://schemas.microsoft.com/office/drawing/2014/main" id="{D1EA859B-E555-4109-94F3-6700E046E008}"/>
@@ -15538,7 +15525,7 @@
       </p:grpSpPr>
       <p:sp useBgFill="1">
         <p:nvSpPr>
-          <p:cNvPr id="30" name="Rectangle 29">
+          <p:cNvPr id="41" name="Rectangle 40">
             <a:extLst>
               <a:ext uri="{FF2B5EF4-FFF2-40B4-BE49-F238E27FC236}">
                 <a16:creationId xmlns:a16="http://schemas.microsoft.com/office/drawing/2014/main" id="{04812C46-200A-4DEB-A05E-3ED6C68C2387}"/>
@@ -15561,7 +15548,7 @@
         </p:nvSpPr>
         <p:spPr>
           <a:xfrm>
-            <a:off x="3049" y="0"/>
+            <a:off x="-1" y="0"/>
             <a:ext cx="12188952" cy="6858000"/>
           </a:xfrm>
           <a:prstGeom prst="rect">
@@ -15598,10 +15585,10 @@
       </p:sp>
       <p:pic>
         <p:nvPicPr>
-          <p:cNvPr id="6" name="Picture 5">
+          <p:cNvPr id="4" name="Picture 3">
             <a:extLst>
               <a:ext uri="{FF2B5EF4-FFF2-40B4-BE49-F238E27FC236}">
-                <a16:creationId xmlns:a16="http://schemas.microsoft.com/office/drawing/2014/main" id="{E51669A6-8E98-A481-F03D-2B85B3F80653}"/>
+                <a16:creationId xmlns:a16="http://schemas.microsoft.com/office/drawing/2014/main" id="{BE040E06-219D-B4EC-1EDF-5F9D1F5780B5}"/>
               </a:ext>
             </a:extLst>
           </p:cNvPr>
@@ -15612,12 +15599,12 @@
         </p:nvPicPr>
         <p:blipFill>
           <a:blip r:embed="rId2"/>
-          <a:srcRect l="1653" r="2" b="2"/>
+          <a:srcRect l="661" r="994" b="2"/>
           <a:stretch/>
         </p:blipFill>
         <p:spPr>
           <a:xfrm>
-            <a:off x="2522356" y="10"/>
+            <a:off x="1" y="10"/>
             <a:ext cx="9669642" cy="6857990"/>
           </a:xfrm>
           <a:prstGeom prst="rect">
@@ -15627,7 +15614,7 @@
       </p:pic>
       <p:sp>
         <p:nvSpPr>
-          <p:cNvPr id="32" name="Rectangle 31">
+          <p:cNvPr id="42" name="Rectangle 41">
             <a:extLst>
               <a:ext uri="{FF2B5EF4-FFF2-40B4-BE49-F238E27FC236}">
                 <a16:creationId xmlns:a16="http://schemas.microsoft.com/office/drawing/2014/main" id="{D1EA859B-E555-4109-94F3-6700E046E008}"/>
@@ -15649,9 +15636,9 @@
           </p:nvPr>
         </p:nvSpPr>
         <p:spPr>
-          <a:xfrm>
-            <a:off x="-1" y="0"/>
-            <a:ext cx="7390263" cy="6858000"/>
+          <a:xfrm flipH="1">
+            <a:off x="5125019" y="0"/>
+            <a:ext cx="7066978" cy="6858000"/>
           </a:xfrm>
           <a:prstGeom prst="rect">
             <a:avLst/>
@@ -15729,7 +15716,7 @@
         </p:nvSpPr>
         <p:spPr>
           <a:xfrm>
-            <a:off x="838200" y="365125"/>
+            <a:off x="7531610" y="365125"/>
             <a:ext cx="3822189" cy="1899912"/>
           </a:xfrm>
         </p:spPr>
@@ -15740,9 +15727,10 @@
           <a:lstStyle/>
           <a:p>
             <a:r>
-              <a:rPr lang="en-US" sz="3700" b="1" dirty="0"/>
+              <a:rPr lang="en-US" sz="3700" b="1"/>
               <a:t>Scatter plot of Price vs. Number of Reviews</a:t>
             </a:r>
+            <a:endParaRPr lang="en-US" sz="3700" b="1" dirty="0"/>
           </a:p>
         </p:txBody>
       </p:sp>
@@ -15764,7 +15752,7 @@
         </p:nvSpPr>
         <p:spPr bwMode="auto">
           <a:xfrm>
-            <a:off x="838200" y="2434201"/>
+            <a:off x="7531610" y="2434201"/>
             <a:ext cx="3822189" cy="3742762"/>
           </a:xfrm>
           <a:prstGeom prst="rect">
@@ -15820,7 +15808,7 @@
               <a:tabLst/>
             </a:pPr>
             <a:r>
-              <a:rPr kumimoji="0" lang="en-US" altLang="en-US" sz="1400" b="1" i="0" u="none" strike="noStrike" cap="none" normalizeH="0" baseline="0" dirty="0">
+              <a:rPr kumimoji="0" lang="en-US" altLang="en-US" sz="1600" b="1" i="0" u="none" strike="noStrike" cap="none" normalizeH="0" baseline="0">
                 <a:ln>
                   <a:noFill/>
                 </a:ln>
@@ -15829,7 +15817,7 @@
               <a:t>Price Distribution:</a:t>
             </a:r>
             <a:r>
-              <a:rPr kumimoji="0" lang="en-US" altLang="en-US" sz="1400" b="0" i="0" u="none" strike="noStrike" cap="none" normalizeH="0" baseline="0" dirty="0">
+              <a:rPr kumimoji="0" lang="en-US" altLang="en-US" sz="1600" b="0" i="0" u="none" strike="noStrike" cap="none" normalizeH="0" baseline="0">
                 <a:ln>
                   <a:noFill/>
                 </a:ln>
@@ -15850,7 +15838,7 @@
               <a:buSzTx/>
               <a:tabLst/>
             </a:pPr>
-            <a:endParaRPr kumimoji="0" lang="en-US" altLang="en-US" sz="1400" b="0" i="0" u="none" strike="noStrike" cap="none" normalizeH="0" baseline="0" dirty="0">
+            <a:endParaRPr kumimoji="0" lang="en-US" altLang="en-US" sz="1600" b="0" i="0" u="none" strike="noStrike" cap="none" normalizeH="0" baseline="0">
               <a:ln>
                 <a:noFill/>
               </a:ln>
@@ -15870,7 +15858,7 @@
               <a:tabLst/>
             </a:pPr>
             <a:r>
-              <a:rPr kumimoji="0" lang="en-US" altLang="en-US" sz="1400" b="1" i="0" u="none" strike="noStrike" cap="none" normalizeH="0" baseline="0" dirty="0">
+              <a:rPr kumimoji="0" lang="en-US" altLang="en-US" sz="1600" b="1" i="0" u="none" strike="noStrike" cap="none" normalizeH="0" baseline="0">
                 <a:ln>
                   <a:noFill/>
                 </a:ln>
@@ -15879,7 +15867,7 @@
               <a:t>Review Counts:</a:t>
             </a:r>
             <a:r>
-              <a:rPr kumimoji="0" lang="en-US" altLang="en-US" sz="1400" b="0" i="0" u="none" strike="noStrike" cap="none" normalizeH="0" baseline="0" dirty="0">
+              <a:rPr kumimoji="0" lang="en-US" altLang="en-US" sz="1600" b="0" i="0" u="none" strike="noStrike" cap="none" normalizeH="0" baseline="0">
                 <a:ln>
                   <a:noFill/>
                 </a:ln>
@@ -15900,7 +15888,7 @@
               <a:buSzTx/>
               <a:tabLst/>
             </a:pPr>
-            <a:endParaRPr kumimoji="0" lang="en-US" altLang="en-US" sz="1400" b="0" i="0" u="none" strike="noStrike" cap="none" normalizeH="0" baseline="0" dirty="0">
+            <a:endParaRPr kumimoji="0" lang="en-US" altLang="en-US" sz="1600" b="0" i="0" u="none" strike="noStrike" cap="none" normalizeH="0" baseline="0">
               <a:ln>
                 <a:noFill/>
               </a:ln>
@@ -15920,7 +15908,7 @@
               <a:tabLst/>
             </a:pPr>
             <a:r>
-              <a:rPr kumimoji="0" lang="en-US" altLang="en-US" sz="1400" b="1" i="0" u="none" strike="noStrike" cap="none" normalizeH="0" baseline="0" dirty="0">
+              <a:rPr kumimoji="0" lang="en-US" altLang="en-US" sz="1600" b="1" i="0" u="none" strike="noStrike" cap="none" normalizeH="0" baseline="0">
                 <a:ln>
                   <a:noFill/>
                 </a:ln>
@@ -15929,7 +15917,7 @@
               <a:t>Winter Seasons:</a:t>
             </a:r>
             <a:r>
-              <a:rPr kumimoji="0" lang="en-US" altLang="en-US" sz="1400" b="0" i="0" u="none" strike="noStrike" cap="none" normalizeH="0" baseline="0" dirty="0">
+              <a:rPr kumimoji="0" lang="en-US" altLang="en-US" sz="1600" b="0" i="0" u="none" strike="noStrike" cap="none" normalizeH="0" baseline="0">
                 <a:ln>
                   <a:noFill/>
                 </a:ln>
@@ -15950,22 +15938,22 @@
               <a:buSzTx/>
               <a:tabLst/>
             </a:pPr>
-            <a:endParaRPr lang="en-US" altLang="en-US" sz="1400" dirty="0"/>
+            <a:endParaRPr lang="en-US" altLang="en-US" sz="1600"/>
           </a:p>
           <a:p>
             <a:r>
-              <a:rPr lang="en-US" sz="1400" b="1" dirty="0"/>
+              <a:rPr lang="en-US" sz="1600" b="1"/>
               <a:t>No Clear Correlation</a:t>
             </a:r>
-            <a:endParaRPr lang="en-US" sz="1400" dirty="0"/>
+            <a:endParaRPr lang="en-US" sz="1600"/>
           </a:p>
           <a:p>
             <a:r>
-              <a:rPr lang="en-US" sz="1400" b="1" dirty="0"/>
+              <a:rPr lang="en-US" sz="1600" b="1"/>
               <a:t>Seasonal Impact:</a:t>
             </a:r>
             <a:r>
-              <a:rPr lang="en-US" sz="1400" dirty="0"/>
+              <a:rPr lang="en-US" sz="1600"/>
               <a:t> Late Summer and Early Fall are peak seasons with more guest interactions.</a:t>
             </a:r>
           </a:p>
@@ -15981,7 +15969,7 @@
               <a:buSzTx/>
               <a:tabLst/>
             </a:pPr>
-            <a:endParaRPr kumimoji="0" lang="en-US" altLang="en-US" sz="1400" b="0" i="0" u="none" strike="noStrike" cap="none" normalizeH="0" baseline="0" dirty="0">
+            <a:endParaRPr kumimoji="0" lang="en-US" altLang="en-US" sz="1600" b="0" i="0" u="none" strike="noStrike" cap="none" normalizeH="0" baseline="0">
               <a:ln>
                 <a:noFill/>
               </a:ln>

</xml_diff>

<commit_message>
updated project with transitions
</commit_message>
<xml_diff>
--- a/Project.pptx
+++ b/Project.pptx
@@ -5,7 +5,7 @@
     <p:sldMasterId id="2147483648" r:id="rId1"/>
   </p:sldMasterIdLst>
   <p:notesMasterIdLst>
-    <p:notesMasterId r:id="rId16"/>
+    <p:notesMasterId r:id="rId17"/>
   </p:notesMasterIdLst>
   <p:sldIdLst>
     <p:sldId id="256" r:id="rId2"/>
@@ -20,8 +20,9 @@
     <p:sldId id="262" r:id="rId11"/>
     <p:sldId id="266" r:id="rId12"/>
     <p:sldId id="267" r:id="rId13"/>
-    <p:sldId id="269" r:id="rId14"/>
-    <p:sldId id="268" r:id="rId15"/>
+    <p:sldId id="270" r:id="rId14"/>
+    <p:sldId id="269" r:id="rId15"/>
+    <p:sldId id="268" r:id="rId16"/>
   </p:sldIdLst>
   <p:sldSz cx="12192000" cy="6858000"/>
   <p:notesSz cx="6858000" cy="9144000"/>
@@ -122,7 +123,18 @@
   </p:defaultTextStyle>
   <p:extLst>
     <p:ext uri="{EFAFB233-063F-42B5-8137-9DF3F51BA10A}">
-      <p15:sldGuideLst xmlns:p15="http://schemas.microsoft.com/office/powerpoint/2012/main"/>
+      <p15:sldGuideLst xmlns:p15="http://schemas.microsoft.com/office/powerpoint/2012/main">
+        <p15:guide id="1" orient="horz" pos="2160" userDrawn="1">
+          <p15:clr>
+            <a:srgbClr val="A4A3A4"/>
+          </p15:clr>
+        </p15:guide>
+        <p15:guide id="2" pos="3840" userDrawn="1">
+          <p15:clr>
+            <a:srgbClr val="A4A3A4"/>
+          </p15:clr>
+        </p15:guide>
+      </p15:sldGuideLst>
     </p:ext>
   </p:extLst>
 </p:presentation>
@@ -10317,7 +10329,7 @@
           <a:p>
             <a:fld id="{74E5AC1B-AAC2-4392-81D1-337E709D6257}" type="datetimeFigureOut">
               <a:rPr lang="en-US" smtClean="0"/>
-              <a:t>8/8/2024</a:t>
+              <a:t>8/12/2024</a:t>
             </a:fld>
             <a:endParaRPr lang="en-US"/>
           </a:p>
@@ -10815,7 +10827,7 @@
           <a:p>
             <a:fld id="{FC64FDDC-7516-4483-AE0C-A7CAA737B28A}" type="datetimeFigureOut">
               <a:rPr lang="en-US" smtClean="0"/>
-              <a:t>8/8/2024</a:t>
+              <a:t>8/12/2024</a:t>
             </a:fld>
             <a:endParaRPr lang="en-US"/>
           </a:p>
@@ -11013,7 +11025,7 @@
           <a:p>
             <a:fld id="{FC64FDDC-7516-4483-AE0C-A7CAA737B28A}" type="datetimeFigureOut">
               <a:rPr lang="en-US" smtClean="0"/>
-              <a:t>8/8/2024</a:t>
+              <a:t>8/12/2024</a:t>
             </a:fld>
             <a:endParaRPr lang="en-US"/>
           </a:p>
@@ -11221,7 +11233,7 @@
           <a:p>
             <a:fld id="{FC64FDDC-7516-4483-AE0C-A7CAA737B28A}" type="datetimeFigureOut">
               <a:rPr lang="en-US" smtClean="0"/>
-              <a:t>8/8/2024</a:t>
+              <a:t>8/12/2024</a:t>
             </a:fld>
             <a:endParaRPr lang="en-US"/>
           </a:p>
@@ -11419,7 +11431,7 @@
           <a:p>
             <a:fld id="{FC64FDDC-7516-4483-AE0C-A7CAA737B28A}" type="datetimeFigureOut">
               <a:rPr lang="en-US" smtClean="0"/>
-              <a:t>8/8/2024</a:t>
+              <a:t>8/12/2024</a:t>
             </a:fld>
             <a:endParaRPr lang="en-US"/>
           </a:p>
@@ -11694,7 +11706,7 @@
           <a:p>
             <a:fld id="{FC64FDDC-7516-4483-AE0C-A7CAA737B28A}" type="datetimeFigureOut">
               <a:rPr lang="en-US" smtClean="0"/>
-              <a:t>8/8/2024</a:t>
+              <a:t>8/12/2024</a:t>
             </a:fld>
             <a:endParaRPr lang="en-US"/>
           </a:p>
@@ -11959,7 +11971,7 @@
           <a:p>
             <a:fld id="{FC64FDDC-7516-4483-AE0C-A7CAA737B28A}" type="datetimeFigureOut">
               <a:rPr lang="en-US" smtClean="0"/>
-              <a:t>8/8/2024</a:t>
+              <a:t>8/12/2024</a:t>
             </a:fld>
             <a:endParaRPr lang="en-US"/>
           </a:p>
@@ -12371,7 +12383,7 @@
           <a:p>
             <a:fld id="{FC64FDDC-7516-4483-AE0C-A7CAA737B28A}" type="datetimeFigureOut">
               <a:rPr lang="en-US" smtClean="0"/>
-              <a:t>8/8/2024</a:t>
+              <a:t>8/12/2024</a:t>
             </a:fld>
             <a:endParaRPr lang="en-US"/>
           </a:p>
@@ -12512,7 +12524,7 @@
           <a:p>
             <a:fld id="{FC64FDDC-7516-4483-AE0C-A7CAA737B28A}" type="datetimeFigureOut">
               <a:rPr lang="en-US" smtClean="0"/>
-              <a:t>8/8/2024</a:t>
+              <a:t>8/12/2024</a:t>
             </a:fld>
             <a:endParaRPr lang="en-US"/>
           </a:p>
@@ -12625,7 +12637,7 @@
           <a:p>
             <a:fld id="{FC64FDDC-7516-4483-AE0C-A7CAA737B28A}" type="datetimeFigureOut">
               <a:rPr lang="en-US" smtClean="0"/>
-              <a:t>8/8/2024</a:t>
+              <a:t>8/12/2024</a:t>
             </a:fld>
             <a:endParaRPr lang="en-US"/>
           </a:p>
@@ -12936,7 +12948,7 @@
           <a:p>
             <a:fld id="{FC64FDDC-7516-4483-AE0C-A7CAA737B28A}" type="datetimeFigureOut">
               <a:rPr lang="en-US" smtClean="0"/>
-              <a:t>8/8/2024</a:t>
+              <a:t>8/12/2024</a:t>
             </a:fld>
             <a:endParaRPr lang="en-US"/>
           </a:p>
@@ -13224,7 +13236,7 @@
           <a:p>
             <a:fld id="{FC64FDDC-7516-4483-AE0C-A7CAA737B28A}" type="datetimeFigureOut">
               <a:rPr lang="en-US" smtClean="0"/>
-              <a:t>8/8/2024</a:t>
+              <a:t>8/12/2024</a:t>
             </a:fld>
             <a:endParaRPr lang="en-US"/>
           </a:p>
@@ -13465,7 +13477,7 @@
           <a:p>
             <a:fld id="{FC64FDDC-7516-4483-AE0C-A7CAA737B28A}" type="datetimeFigureOut">
               <a:rPr lang="en-US" smtClean="0"/>
-              <a:t>8/8/2024</a:t>
+              <a:t>8/12/2024</a:t>
             </a:fld>
             <a:endParaRPr lang="en-US"/>
           </a:p>
@@ -14709,6 +14721,18 @@
   <p:clrMapOvr>
     <a:masterClrMapping/>
   </p:clrMapOvr>
+  <mc:AlternateContent xmlns:mc="http://schemas.openxmlformats.org/markup-compatibility/2006">
+    <mc:Choice xmlns:p15="http://schemas.microsoft.com/office/powerpoint/2012/main" Requires="p15">
+      <p:transition xmlns:p14="http://schemas.microsoft.com/office/powerpoint/2010/main" spd="slow" p14:dur="2000">
+        <p15:prstTrans prst="prestige"/>
+      </p:transition>
+    </mc:Choice>
+    <mc:Fallback>
+      <p:transition spd="slow">
+        <p:fade/>
+      </p:transition>
+    </mc:Fallback>
+  </mc:AlternateContent>
 </p:sld>
 </file>
 
@@ -15100,6 +15124,18 @@
   <p:clrMapOvr>
     <a:masterClrMapping/>
   </p:clrMapOvr>
+  <mc:AlternateContent xmlns:mc="http://schemas.openxmlformats.org/markup-compatibility/2006">
+    <mc:Choice xmlns:p14="http://schemas.microsoft.com/office/powerpoint/2010/main" Requires="p14">
+      <p:transition spd="slow" p14:dur="3400">
+        <p14:reveal/>
+      </p:transition>
+    </mc:Choice>
+    <mc:Fallback>
+      <p:transition spd="slow">
+        <p:fade/>
+      </p:transition>
+    </mc:Fallback>
+  </mc:AlternateContent>
 </p:sld>
 </file>
 
@@ -15495,10 +15531,414 @@
   <p:clrMapOvr>
     <a:masterClrMapping/>
   </p:clrMapOvr>
+  <mc:AlternateContent xmlns:mc="http://schemas.openxmlformats.org/markup-compatibility/2006">
+    <mc:Choice xmlns:p14="http://schemas.microsoft.com/office/powerpoint/2010/main" Requires="p14">
+      <p:transition spd="med" p14:dur="700">
+        <p:fade/>
+      </p:transition>
+    </mc:Choice>
+    <mc:Fallback>
+      <p:transition spd="med">
+        <p:fade/>
+      </p:transition>
+    </mc:Fallback>
+  </mc:AlternateContent>
 </p:sld>
 </file>
 
 <file path=ppt/slides/slide13.xml><?xml version="1.0" encoding="utf-8"?>
+<p:sld xmlns:a="http://schemas.openxmlformats.org/drawingml/2006/main" xmlns:r="http://schemas.openxmlformats.org/officeDocument/2006/relationships" xmlns:p="http://schemas.openxmlformats.org/presentationml/2006/main">
+  <p:cSld>
+    <p:bg>
+      <p:bgPr>
+        <a:solidFill>
+          <a:schemeClr val="bg1"/>
+        </a:solidFill>
+        <a:effectLst/>
+      </p:bgPr>
+    </p:bg>
+    <p:spTree>
+      <p:nvGrpSpPr>
+        <p:cNvPr id="1" name=""/>
+        <p:cNvGrpSpPr/>
+        <p:nvPr/>
+      </p:nvGrpSpPr>
+      <p:grpSpPr>
+        <a:xfrm>
+          <a:off x="0" y="0"/>
+          <a:ext cx="0" cy="0"/>
+          <a:chOff x="0" y="0"/>
+          <a:chExt cx="0" cy="0"/>
+        </a:xfrm>
+      </p:grpSpPr>
+      <p:pic>
+        <p:nvPicPr>
+          <p:cNvPr id="17" name="Picture 16" descr="A graph showing the average price of fall seasons&#10;&#10;Description automatically generated">
+            <a:extLst>
+              <a:ext uri="{FF2B5EF4-FFF2-40B4-BE49-F238E27FC236}">
+                <a16:creationId xmlns:a16="http://schemas.microsoft.com/office/drawing/2014/main" id="{2DAC76D0-25F0-D872-1398-F308E9023C2D}"/>
+              </a:ext>
+            </a:extLst>
+          </p:cNvPr>
+          <p:cNvPicPr>
+            <a:picLocks noChangeAspect="1"/>
+          </p:cNvPicPr>
+          <p:nvPr/>
+        </p:nvPicPr>
+        <p:blipFill>
+          <a:blip r:embed="rId2">
+            <a:extLst>
+              <a:ext uri="{28A0092B-C50C-407E-A947-70E740481C1C}">
+                <a14:useLocalDpi xmlns:a14="http://schemas.microsoft.com/office/drawing/2010/main" val="0"/>
+              </a:ext>
+            </a:extLst>
+          </a:blip>
+          <a:stretch>
+            <a:fillRect/>
+          </a:stretch>
+        </p:blipFill>
+        <p:spPr>
+          <a:xfrm>
+            <a:off x="681699" y="25307"/>
+            <a:ext cx="4763082" cy="3357973"/>
+          </a:xfrm>
+          <a:prstGeom prst="rect">
+            <a:avLst/>
+          </a:prstGeom>
+        </p:spPr>
+      </p:pic>
+      <p:sp>
+        <p:nvSpPr>
+          <p:cNvPr id="29" name="Rectangle 28">
+            <a:extLst>
+              <a:ext uri="{FF2B5EF4-FFF2-40B4-BE49-F238E27FC236}">
+                <a16:creationId xmlns:a16="http://schemas.microsoft.com/office/drawing/2014/main" id="{417CDA24-35F8-4540-8C52-3096D6D94949}"/>
+              </a:ext>
+              <a:ext uri="{C183D7F6-B498-43B3-948B-1728B52AA6E4}">
+                <adec:decorative xmlns:adec="http://schemas.microsoft.com/office/drawing/2017/decorative" val="1"/>
+              </a:ext>
+            </a:extLst>
+          </p:cNvPr>
+          <p:cNvSpPr>
+            <a:spLocks noGrp="1" noRot="1" noChangeAspect="1" noMove="1" noResize="1" noEditPoints="1" noAdjustHandles="1" noChangeArrowheads="1" noChangeShapeType="1" noTextEdit="1"/>
+          </p:cNvSpPr>
+          <p:nvPr>
+            <p:extLst>
+              <p:ext uri="{386F3935-93C4-4BCD-93E2-E3B085C9AB24}">
+                <p16:designElem xmlns:p16="http://schemas.microsoft.com/office/powerpoint/2015/main" val="1"/>
+              </p:ext>
+            </p:extLst>
+          </p:nvPr>
+        </p:nvSpPr>
+        <p:spPr>
+          <a:xfrm>
+            <a:off x="6050280" y="0"/>
+            <a:ext cx="91440" cy="6858000"/>
+          </a:xfrm>
+          <a:prstGeom prst="rect">
+            <a:avLst/>
+          </a:prstGeom>
+          <a:solidFill>
+            <a:schemeClr val="tx1">
+              <a:lumMod val="75000"/>
+              <a:lumOff val="25000"/>
+            </a:schemeClr>
+          </a:solidFill>
+          <a:ln>
+            <a:noFill/>
+          </a:ln>
+        </p:spPr>
+        <p:style>
+          <a:lnRef idx="2">
+            <a:schemeClr val="accent1">
+              <a:shade val="50000"/>
+            </a:schemeClr>
+          </a:lnRef>
+          <a:fillRef idx="1">
+            <a:schemeClr val="accent1"/>
+          </a:fillRef>
+          <a:effectRef idx="0">
+            <a:schemeClr val="accent1"/>
+          </a:effectRef>
+          <a:fontRef idx="minor">
+            <a:schemeClr val="lt1"/>
+          </a:fontRef>
+        </p:style>
+        <p:txBody>
+          <a:bodyPr rtlCol="0" anchor="ctr"/>
+          <a:lstStyle/>
+          <a:p>
+            <a:pPr algn="ctr"/>
+            <a:endParaRPr lang="en-US"/>
+          </a:p>
+        </p:txBody>
+      </p:sp>
+      <p:pic>
+        <p:nvPicPr>
+          <p:cNvPr id="15" name="Picture 14" descr="A graph of different colored bars&#10;&#10;Description automatically generated">
+            <a:extLst>
+              <a:ext uri="{FF2B5EF4-FFF2-40B4-BE49-F238E27FC236}">
+                <a16:creationId xmlns:a16="http://schemas.microsoft.com/office/drawing/2014/main" id="{8A25D848-6862-11CE-AA9A-8EF0DA000969}"/>
+              </a:ext>
+            </a:extLst>
+          </p:cNvPr>
+          <p:cNvPicPr>
+            <a:picLocks noChangeAspect="1"/>
+          </p:cNvPicPr>
+          <p:nvPr/>
+        </p:nvPicPr>
+        <p:blipFill>
+          <a:blip r:embed="rId3">
+            <a:extLst>
+              <a:ext uri="{28A0092B-C50C-407E-A947-70E740481C1C}">
+                <a14:useLocalDpi xmlns:a14="http://schemas.microsoft.com/office/drawing/2010/main" val="0"/>
+              </a:ext>
+            </a:extLst>
+          </a:blip>
+          <a:stretch>
+            <a:fillRect/>
+          </a:stretch>
+        </p:blipFill>
+        <p:spPr>
+          <a:xfrm>
+            <a:off x="6920275" y="36345"/>
+            <a:ext cx="4493744" cy="3190559"/>
+          </a:xfrm>
+          <a:prstGeom prst="rect">
+            <a:avLst/>
+          </a:prstGeom>
+        </p:spPr>
+      </p:pic>
+      <p:sp>
+        <p:nvSpPr>
+          <p:cNvPr id="30" name="Rectangle 29">
+            <a:extLst>
+              <a:ext uri="{FF2B5EF4-FFF2-40B4-BE49-F238E27FC236}">
+                <a16:creationId xmlns:a16="http://schemas.microsoft.com/office/drawing/2014/main" id="{8658BFE0-4E65-4174-9C75-687C94E88273}"/>
+              </a:ext>
+              <a:ext uri="{C183D7F6-B498-43B3-948B-1728B52AA6E4}">
+                <adec:decorative xmlns:adec="http://schemas.microsoft.com/office/drawing/2017/decorative" val="1"/>
+              </a:ext>
+            </a:extLst>
+          </p:cNvPr>
+          <p:cNvSpPr>
+            <a:spLocks noGrp="1" noRot="1" noChangeAspect="1" noMove="1" noResize="1" noEditPoints="1" noAdjustHandles="1" noChangeArrowheads="1" noChangeShapeType="1" noTextEdit="1"/>
+          </p:cNvSpPr>
+          <p:nvPr>
+            <p:extLst>
+              <p:ext uri="{386F3935-93C4-4BCD-93E2-E3B085C9AB24}">
+                <p16:designElem xmlns:p16="http://schemas.microsoft.com/office/powerpoint/2015/main" val="1"/>
+              </p:ext>
+            </p:extLst>
+          </p:nvPr>
+        </p:nvSpPr>
+        <p:spPr>
+          <a:xfrm>
+            <a:off x="0" y="3383280"/>
+            <a:ext cx="6126480" cy="91440"/>
+          </a:xfrm>
+          <a:prstGeom prst="rect">
+            <a:avLst/>
+          </a:prstGeom>
+          <a:solidFill>
+            <a:schemeClr val="tx1">
+              <a:lumMod val="75000"/>
+              <a:lumOff val="25000"/>
+            </a:schemeClr>
+          </a:solidFill>
+          <a:ln>
+            <a:noFill/>
+          </a:ln>
+        </p:spPr>
+        <p:style>
+          <a:lnRef idx="2">
+            <a:schemeClr val="accent1">
+              <a:shade val="50000"/>
+            </a:schemeClr>
+          </a:lnRef>
+          <a:fillRef idx="1">
+            <a:schemeClr val="accent1"/>
+          </a:fillRef>
+          <a:effectRef idx="0">
+            <a:schemeClr val="accent1"/>
+          </a:effectRef>
+          <a:fontRef idx="minor">
+            <a:schemeClr val="lt1"/>
+          </a:fontRef>
+        </p:style>
+        <p:txBody>
+          <a:bodyPr rtlCol="0" anchor="ctr"/>
+          <a:lstStyle/>
+          <a:p>
+            <a:pPr algn="ctr"/>
+            <a:endParaRPr lang="en-US"/>
+          </a:p>
+        </p:txBody>
+      </p:sp>
+      <p:sp>
+        <p:nvSpPr>
+          <p:cNvPr id="31" name="Rectangle 30">
+            <a:extLst>
+              <a:ext uri="{FF2B5EF4-FFF2-40B4-BE49-F238E27FC236}">
+                <a16:creationId xmlns:a16="http://schemas.microsoft.com/office/drawing/2014/main" id="{FA75DFED-A0C1-4A83-BE1D-0271C1826EF6}"/>
+              </a:ext>
+              <a:ext uri="{C183D7F6-B498-43B3-948B-1728B52AA6E4}">
+                <adec:decorative xmlns:adec="http://schemas.microsoft.com/office/drawing/2017/decorative" val="1"/>
+              </a:ext>
+            </a:extLst>
+          </p:cNvPr>
+          <p:cNvSpPr>
+            <a:spLocks noGrp="1" noRot="1" noChangeAspect="1" noMove="1" noResize="1" noEditPoints="1" noAdjustHandles="1" noChangeArrowheads="1" noChangeShapeType="1" noTextEdit="1"/>
+          </p:cNvSpPr>
+          <p:nvPr>
+            <p:extLst>
+              <p:ext uri="{386F3935-93C4-4BCD-93E2-E3B085C9AB24}">
+                <p16:designElem xmlns:p16="http://schemas.microsoft.com/office/powerpoint/2015/main" val="1"/>
+              </p:ext>
+            </p:extLst>
+          </p:nvPr>
+        </p:nvSpPr>
+        <p:spPr>
+          <a:xfrm>
+            <a:off x="6065520" y="3383280"/>
+            <a:ext cx="6126480" cy="91440"/>
+          </a:xfrm>
+          <a:prstGeom prst="rect">
+            <a:avLst/>
+          </a:prstGeom>
+          <a:solidFill>
+            <a:schemeClr val="tx1">
+              <a:lumMod val="75000"/>
+              <a:lumOff val="25000"/>
+            </a:schemeClr>
+          </a:solidFill>
+          <a:ln>
+            <a:noFill/>
+          </a:ln>
+        </p:spPr>
+        <p:style>
+          <a:lnRef idx="2">
+            <a:schemeClr val="accent1">
+              <a:shade val="50000"/>
+            </a:schemeClr>
+          </a:lnRef>
+          <a:fillRef idx="1">
+            <a:schemeClr val="accent1"/>
+          </a:fillRef>
+          <a:effectRef idx="0">
+            <a:schemeClr val="accent1"/>
+          </a:effectRef>
+          <a:fontRef idx="minor">
+            <a:schemeClr val="lt1"/>
+          </a:fontRef>
+        </p:style>
+        <p:txBody>
+          <a:bodyPr rtlCol="0" anchor="ctr"/>
+          <a:lstStyle/>
+          <a:p>
+            <a:pPr algn="ctr"/>
+            <a:endParaRPr lang="en-US"/>
+          </a:p>
+        </p:txBody>
+      </p:sp>
+      <p:pic>
+        <p:nvPicPr>
+          <p:cNvPr id="13" name="Picture 12" descr="A graph of a graph showing the average prices&#10;&#10;Description automatically generated with medium confidence">
+            <a:extLst>
+              <a:ext uri="{FF2B5EF4-FFF2-40B4-BE49-F238E27FC236}">
+                <a16:creationId xmlns:a16="http://schemas.microsoft.com/office/drawing/2014/main" id="{7BF76502-4590-4D46-C5A6-52EE05DCC3FF}"/>
+              </a:ext>
+            </a:extLst>
+          </p:cNvPr>
+          <p:cNvPicPr>
+            <a:picLocks noChangeAspect="1"/>
+          </p:cNvPicPr>
+          <p:nvPr/>
+        </p:nvPicPr>
+        <p:blipFill>
+          <a:blip r:embed="rId4">
+            <a:extLst>
+              <a:ext uri="{28A0092B-C50C-407E-A947-70E740481C1C}">
+                <a14:useLocalDpi xmlns:a14="http://schemas.microsoft.com/office/drawing/2010/main" val="0"/>
+              </a:ext>
+            </a:extLst>
+          </a:blip>
+          <a:stretch>
+            <a:fillRect/>
+          </a:stretch>
+        </p:blipFill>
+        <p:spPr>
+          <a:xfrm>
+            <a:off x="879517" y="3537582"/>
+            <a:ext cx="4494046" cy="3168303"/>
+          </a:xfrm>
+          <a:prstGeom prst="rect">
+            <a:avLst/>
+          </a:prstGeom>
+        </p:spPr>
+      </p:pic>
+      <p:pic>
+        <p:nvPicPr>
+          <p:cNvPr id="11" name="Picture 10" descr="A graph of different colored bars&#10;&#10;Description automatically generated">
+            <a:extLst>
+              <a:ext uri="{FF2B5EF4-FFF2-40B4-BE49-F238E27FC236}">
+                <a16:creationId xmlns:a16="http://schemas.microsoft.com/office/drawing/2014/main" id="{5A17EF01-188F-8FFB-F1C8-7BD606EFA05B}"/>
+              </a:ext>
+            </a:extLst>
+          </p:cNvPr>
+          <p:cNvPicPr>
+            <a:picLocks noChangeAspect="1"/>
+          </p:cNvPicPr>
+          <p:nvPr/>
+        </p:nvPicPr>
+        <p:blipFill>
+          <a:blip r:embed="rId5">
+            <a:extLst>
+              <a:ext uri="{28A0092B-C50C-407E-A947-70E740481C1C}">
+                <a14:useLocalDpi xmlns:a14="http://schemas.microsoft.com/office/drawing/2010/main" val="0"/>
+              </a:ext>
+            </a:extLst>
+          </a:blip>
+          <a:stretch>
+            <a:fillRect/>
+          </a:stretch>
+        </p:blipFill>
+        <p:spPr>
+          <a:xfrm>
+            <a:off x="6920275" y="3537582"/>
+            <a:ext cx="4523793" cy="3211893"/>
+          </a:xfrm>
+          <a:prstGeom prst="rect">
+            <a:avLst/>
+          </a:prstGeom>
+        </p:spPr>
+      </p:pic>
+    </p:spTree>
+    <p:extLst>
+      <p:ext uri="{BB962C8B-B14F-4D97-AF65-F5344CB8AC3E}">
+        <p14:creationId xmlns:p14="http://schemas.microsoft.com/office/powerpoint/2010/main" val="1752865049"/>
+      </p:ext>
+    </p:extLst>
+  </p:cSld>
+  <p:clrMapOvr>
+    <a:masterClrMapping/>
+  </p:clrMapOvr>
+  <mc:AlternateContent xmlns:mc="http://schemas.openxmlformats.org/markup-compatibility/2006">
+    <mc:Choice xmlns:p15="http://schemas.microsoft.com/office/powerpoint/2012/main" Requires="p15">
+      <p:transition xmlns:p14="http://schemas.microsoft.com/office/powerpoint/2010/main" spd="slow" p14:dur="2000">
+        <p15:prstTrans prst="fallOver"/>
+      </p:transition>
+    </mc:Choice>
+    <mc:Fallback>
+      <p:transition spd="slow">
+        <p:fade/>
+      </p:transition>
+    </mc:Fallback>
+  </mc:AlternateContent>
+</p:sld>
+</file>
+
+<file path=ppt/slides/slide14.xml><?xml version="1.0" encoding="utf-8"?>
 <p:sld xmlns:a="http://schemas.openxmlformats.org/drawingml/2006/main" xmlns:r="http://schemas.openxmlformats.org/officeDocument/2006/relationships" xmlns:p="http://schemas.openxmlformats.org/presentationml/2006/main">
   <p:cSld>
     <p:bg>
@@ -15988,10 +16428,22 @@
   <p:clrMapOvr>
     <a:masterClrMapping/>
   </p:clrMapOvr>
+  <mc:AlternateContent xmlns:mc="http://schemas.openxmlformats.org/markup-compatibility/2006">
+    <mc:Choice xmlns:p15="http://schemas.microsoft.com/office/powerpoint/2012/main" Requires="p15">
+      <p:transition xmlns:p14="http://schemas.microsoft.com/office/powerpoint/2010/main" spd="slow" p14:dur="1250">
+        <p15:prstTrans prst="peelOff"/>
+      </p:transition>
+    </mc:Choice>
+    <mc:Fallback>
+      <p:transition spd="slow">
+        <p:fade/>
+      </p:transition>
+    </mc:Fallback>
+  </mc:AlternateContent>
 </p:sld>
 </file>
 
-<file path=ppt/slides/slide14.xml><?xml version="1.0" encoding="utf-8"?>
+<file path=ppt/slides/slide15.xml><?xml version="1.0" encoding="utf-8"?>
 <p:sld xmlns:a="http://schemas.openxmlformats.org/drawingml/2006/main" xmlns:r="http://schemas.openxmlformats.org/officeDocument/2006/relationships" xmlns:p="http://schemas.openxmlformats.org/presentationml/2006/main">
   <p:cSld>
     <p:bg>
@@ -16749,6 +17201,18 @@
   <p:clrMapOvr>
     <a:masterClrMapping/>
   </p:clrMapOvr>
+  <mc:AlternateContent xmlns:mc="http://schemas.openxmlformats.org/markup-compatibility/2006">
+    <mc:Choice xmlns:p15="http://schemas.microsoft.com/office/powerpoint/2012/main" Requires="p15">
+      <p:transition xmlns:p14="http://schemas.microsoft.com/office/powerpoint/2010/main" spd="slow" p14:dur="3250">
+        <p15:prstTrans prst="origami"/>
+      </p:transition>
+    </mc:Choice>
+    <mc:Fallback>
+      <p:transition spd="slow">
+        <p:fade/>
+      </p:transition>
+    </mc:Fallback>
+  </mc:AlternateContent>
 </p:sld>
 </file>
 
@@ -17082,6 +17546,18 @@
   <p:clrMapOvr>
     <a:masterClrMapping/>
   </p:clrMapOvr>
+  <mc:AlternateContent xmlns:mc="http://schemas.openxmlformats.org/markup-compatibility/2006">
+    <mc:Choice xmlns:p14="http://schemas.microsoft.com/office/powerpoint/2010/main" Requires="p14">
+      <p:transition spd="slow" p14:dur="800">
+        <p:circle/>
+      </p:transition>
+    </mc:Choice>
+    <mc:Fallback>
+      <p:transition spd="slow">
+        <p:circle/>
+      </p:transition>
+    </mc:Fallback>
+  </mc:AlternateContent>
 </p:sld>
 </file>
 
@@ -17400,6 +17876,18 @@
   <p:clrMapOvr>
     <a:masterClrMapping/>
   </p:clrMapOvr>
+  <mc:AlternateContent xmlns:mc="http://schemas.openxmlformats.org/markup-compatibility/2006">
+    <mc:Choice xmlns:p14="http://schemas.microsoft.com/office/powerpoint/2010/main" Requires="p14">
+      <p:transition spd="slow" p14:dur="800">
+        <p:circle/>
+      </p:transition>
+    </mc:Choice>
+    <mc:Fallback>
+      <p:transition spd="slow">
+        <p:circle/>
+      </p:transition>
+    </mc:Fallback>
+  </mc:AlternateContent>
 </p:sld>
 </file>
 
@@ -17979,6 +18467,18 @@
   <p:clrMapOvr>
     <a:masterClrMapping/>
   </p:clrMapOvr>
+  <mc:AlternateContent xmlns:mc="http://schemas.openxmlformats.org/markup-compatibility/2006">
+    <mc:Choice xmlns:p14="http://schemas.microsoft.com/office/powerpoint/2010/main" Requires="p14">
+      <p:transition spd="slow" p14:dur="800">
+        <p:circle/>
+      </p:transition>
+    </mc:Choice>
+    <mc:Fallback>
+      <p:transition spd="slow">
+        <p:circle/>
+      </p:transition>
+    </mc:Fallback>
+  </mc:AlternateContent>
 </p:sld>
 </file>
 
@@ -18149,6 +18649,18 @@
   <p:clrMapOvr>
     <a:masterClrMapping/>
   </p:clrMapOvr>
+  <mc:AlternateContent xmlns:mc="http://schemas.openxmlformats.org/markup-compatibility/2006">
+    <mc:Choice xmlns:p15="http://schemas.microsoft.com/office/powerpoint/2012/main" Requires="p15">
+      <p:transition xmlns:p14="http://schemas.microsoft.com/office/powerpoint/2010/main" spd="slow" p14:dur="2000">
+        <p15:prstTrans prst="drape"/>
+      </p:transition>
+    </mc:Choice>
+    <mc:Fallback>
+      <p:transition spd="slow">
+        <p:fade/>
+      </p:transition>
+    </mc:Fallback>
+  </mc:AlternateContent>
 </p:sld>
 </file>
 
@@ -18529,6 +19041,9 @@
   <p:clrMapOvr>
     <a:masterClrMapping/>
   </p:clrMapOvr>
+  <p:transition spd="slow">
+    <p:randomBar dir="vert"/>
+  </p:transition>
 </p:sld>
 </file>
 
@@ -18906,6 +19421,18 @@
   <p:clrMapOvr>
     <a:masterClrMapping/>
   </p:clrMapOvr>
+  <mc:AlternateContent xmlns:mc="http://schemas.openxmlformats.org/markup-compatibility/2006">
+    <mc:Choice xmlns:p15="http://schemas.microsoft.com/office/powerpoint/2012/main" Requires="p15">
+      <p:transition xmlns:p14="http://schemas.microsoft.com/office/powerpoint/2010/main" spd="slow" p14:dur="2000">
+        <p15:prstTrans prst="prestige"/>
+      </p:transition>
+    </mc:Choice>
+    <mc:Fallback>
+      <p:transition spd="slow">
+        <p:fade/>
+      </p:transition>
+    </mc:Fallback>
+  </mc:AlternateContent>
 </p:sld>
 </file>
 
@@ -19283,6 +19810,18 @@
   <p:clrMapOvr>
     <a:masterClrMapping/>
   </p:clrMapOvr>
+  <mc:AlternateContent xmlns:mc="http://schemas.openxmlformats.org/markup-compatibility/2006">
+    <mc:Choice xmlns:p15="http://schemas.microsoft.com/office/powerpoint/2012/main" Requires="p15">
+      <p:transition xmlns:p14="http://schemas.microsoft.com/office/powerpoint/2010/main" spd="slow" p14:dur="2000">
+        <p15:prstTrans prst="prestige"/>
+      </p:transition>
+    </mc:Choice>
+    <mc:Fallback>
+      <p:transition spd="slow">
+        <p:fade/>
+      </p:transition>
+    </mc:Fallback>
+  </mc:AlternateContent>
 </p:sld>
 </file>
 

</xml_diff>